<commit_message>
Pushed dms data and added data to presentation powerpoint
</commit_message>
<xml_diff>
--- a/TeamPresentation.pptx
+++ b/TeamPresentation.pptx
@@ -12,7 +12,9 @@
     <p:sldId id="264" r:id="rId6"/>
     <p:sldId id="265" r:id="rId7"/>
     <p:sldId id="268" r:id="rId8"/>
-    <p:sldId id="266" r:id="rId9"/>
+    <p:sldId id="269" r:id="rId9"/>
+    <p:sldId id="270" r:id="rId10"/>
+    <p:sldId id="266" r:id="rId11"/>
   </p:sldIdLst>
   <p:sldSz cx="12192000" cy="6858000"/>
   <p:notesSz cx="6858000" cy="9144000"/>
@@ -123,6 +125,8 @@
             <p14:sldId id="264"/>
             <p14:sldId id="265"/>
             <p14:sldId id="268"/>
+            <p14:sldId id="269"/>
+            <p14:sldId id="270"/>
             <p14:sldId id="266"/>
           </p14:sldIdLst>
         </p14:section>
@@ -277,7 +281,7 @@
           <a:p>
             <a:fld id="{9184DA70-C731-4C70-880D-CCD4705E623C}" type="datetime1">
               <a:rPr lang="en-US" smtClean="0"/>
-              <a:t>1/31/2020</a:t>
+              <a:t>01-Feb-20</a:t>
             </a:fld>
             <a:endParaRPr lang="en-US" dirty="0"/>
           </a:p>
@@ -497,7 +501,7 @@
           <a:p>
             <a:fld id="{B612A279-0833-481D-8C56-F67FD0AC6C50}" type="datetime1">
               <a:rPr lang="en-US" smtClean="0"/>
-              <a:t>1/31/2020</a:t>
+              <a:t>01-Feb-20</a:t>
             </a:fld>
             <a:endParaRPr lang="en-US" dirty="0"/>
           </a:p>
@@ -721,7 +725,7 @@
           <a:p>
             <a:fld id="{6587DA83-5663-4C9C-B9AA-0B40A3DAFF81}" type="datetime1">
               <a:rPr lang="en-US" smtClean="0"/>
-              <a:t>1/31/2020</a:t>
+              <a:t>01-Feb-20</a:t>
             </a:fld>
             <a:endParaRPr lang="en-US" dirty="0"/>
           </a:p>
@@ -935,7 +939,7 @@
           <a:p>
             <a:fld id="{4BE1D723-8F53-4F53-90B0-1982A396982E}" type="datetime1">
               <a:rPr lang="en-US" smtClean="0"/>
-              <a:t>1/31/2020</a:t>
+              <a:t>01-Feb-20</a:t>
             </a:fld>
             <a:endParaRPr lang="en-US" dirty="0"/>
           </a:p>
@@ -1227,7 +1231,7 @@
           <a:p>
             <a:fld id="{97669AF7-7BEB-44E4-9852-375E34362B5B}" type="datetime1">
               <a:rPr lang="en-US" smtClean="0"/>
-              <a:t>1/31/2020</a:t>
+              <a:t>01-Feb-20</a:t>
             </a:fld>
             <a:endParaRPr lang="en-US" dirty="0"/>
           </a:p>
@@ -1504,7 +1508,7 @@
           <a:p>
             <a:fld id="{BAAAC38D-0552-4C82-B593-E6124DFADBE2}" type="datetime1">
               <a:rPr lang="en-US" smtClean="0"/>
-              <a:t>1/31/2020</a:t>
+              <a:t>01-Feb-20</a:t>
             </a:fld>
             <a:endParaRPr lang="en-US" dirty="0"/>
           </a:p>
@@ -1929,7 +1933,7 @@
           <a:p>
             <a:fld id="{D9DF0F1C-5577-4ACB-BB62-DF8F3C494C7E}" type="datetime1">
               <a:rPr lang="en-US" smtClean="0"/>
-              <a:t>1/31/2020</a:t>
+              <a:t>01-Feb-20</a:t>
             </a:fld>
             <a:endParaRPr lang="en-US" dirty="0"/>
           </a:p>
@@ -2087,7 +2091,7 @@
           <a:p>
             <a:fld id="{1775B394-D9F9-4F0C-B15D-605F45CB9E9F}" type="datetime1">
               <a:rPr lang="en-US" smtClean="0"/>
-              <a:t>1/31/2020</a:t>
+              <a:t>01-Feb-20</a:t>
             </a:fld>
             <a:endParaRPr lang="en-US" dirty="0"/>
           </a:p>
@@ -2222,7 +2226,7 @@
           <a:p>
             <a:fld id="{39667345-2558-425A-8533-9BFDBCE15005}" type="datetime1">
               <a:rPr lang="en-US" smtClean="0"/>
-              <a:t>1/31/2020</a:t>
+              <a:t>01-Feb-20</a:t>
             </a:fld>
             <a:endParaRPr lang="en-US" dirty="0"/>
           </a:p>
@@ -2473,7 +2477,7 @@
           <a:p>
             <a:fld id="{92BEA474-078D-4E9B-9B14-09A87B19DC46}" type="datetime1">
               <a:rPr lang="en-US" smtClean="0"/>
-              <a:t>1/31/2020</a:t>
+              <a:t>01-Feb-20</a:t>
             </a:fld>
             <a:endParaRPr lang="en-US" dirty="0"/>
           </a:p>
@@ -2934,7 +2938,7 @@
           <a:p>
             <a:fld id="{4907D986-8816-4272-A432-0437A28A9828}" type="datetime1">
               <a:rPr lang="en-US" smtClean="0"/>
-              <a:t>1/31/2020</a:t>
+              <a:t>01-Feb-20</a:t>
             </a:fld>
             <a:endParaRPr lang="en-US" dirty="0"/>
           </a:p>
@@ -3317,7 +3321,7 @@
           <a:p>
             <a:fld id="{62D6E202-B606-4609-B914-27C9371A1F6D}" type="datetime1">
               <a:rPr lang="en-US" smtClean="0"/>
-              <a:t>1/31/2020</a:t>
+              <a:t>01-Feb-20</a:t>
             </a:fld>
             <a:endParaRPr lang="en-US" dirty="0"/>
           </a:p>
@@ -3923,6 +3927,210 @@
 </p:sld>
 </file>
 
+<file path=ppt/slides/slide10.xml><?xml version="1.0" encoding="utf-8"?>
+<p:sld xmlns:a="http://schemas.openxmlformats.org/drawingml/2006/main" xmlns:r="http://schemas.openxmlformats.org/officeDocument/2006/relationships" xmlns:p="http://schemas.openxmlformats.org/presentationml/2006/main">
+  <p:cSld>
+    <p:spTree>
+      <p:nvGrpSpPr>
+        <p:cNvPr id="1" name=""/>
+        <p:cNvGrpSpPr/>
+        <p:nvPr/>
+      </p:nvGrpSpPr>
+      <p:grpSpPr>
+        <a:xfrm>
+          <a:off x="0" y="0"/>
+          <a:ext cx="0" cy="0"/>
+          <a:chOff x="0" y="0"/>
+          <a:chExt cx="0" cy="0"/>
+        </a:xfrm>
+      </p:grpSpPr>
+      <p:sp>
+        <p:nvSpPr>
+          <p:cNvPr id="2" name="Title 1">
+            <a:extLst>
+              <a:ext uri="{FF2B5EF4-FFF2-40B4-BE49-F238E27FC236}">
+                <a16:creationId xmlns:a16="http://schemas.microsoft.com/office/drawing/2014/main" id="{F1C30148-373A-4E73-AE12-CD8C4A127E2B}"/>
+              </a:ext>
+            </a:extLst>
+          </p:cNvPr>
+          <p:cNvSpPr>
+            <a:spLocks noGrp="1"/>
+          </p:cNvSpPr>
+          <p:nvPr>
+            <p:ph type="title"/>
+          </p:nvPr>
+        </p:nvSpPr>
+        <p:spPr>
+          <a:xfrm>
+            <a:off x="1130270" y="953324"/>
+            <a:ext cx="9603275" cy="610433"/>
+          </a:xfrm>
+        </p:spPr>
+        <p:txBody>
+          <a:bodyPr/>
+          <a:lstStyle/>
+          <a:p>
+            <a:pPr algn="ctr"/>
+            <a:r>
+              <a:rPr lang="en-US" dirty="0"/>
+              <a:t>Summary:</a:t>
+            </a:r>
+          </a:p>
+        </p:txBody>
+      </p:sp>
+      <p:sp>
+        <p:nvSpPr>
+          <p:cNvPr id="4" name="TextBox 3">
+            <a:extLst>
+              <a:ext uri="{FF2B5EF4-FFF2-40B4-BE49-F238E27FC236}">
+                <a16:creationId xmlns:a16="http://schemas.microsoft.com/office/drawing/2014/main" id="{BB054297-E15A-4972-BBF9-8703418C9E84}"/>
+              </a:ext>
+            </a:extLst>
+          </p:cNvPr>
+          <p:cNvSpPr txBox="1"/>
+          <p:nvPr/>
+        </p:nvSpPr>
+        <p:spPr>
+          <a:xfrm>
+            <a:off x="1130270" y="1683026"/>
+            <a:ext cx="9603275" cy="3970318"/>
+          </a:xfrm>
+          <a:prstGeom prst="rect">
+            <a:avLst/>
+          </a:prstGeom>
+          <a:noFill/>
+        </p:spPr>
+        <p:txBody>
+          <a:bodyPr wrap="square" rtlCol="0">
+            <a:spAutoFit/>
+          </a:bodyPr>
+          <a:lstStyle/>
+          <a:p>
+            <a:pPr marL="285750" indent="-285750">
+              <a:buFont typeface="Arial" panose="020B0604020202020204" pitchFamily="34" charset="0"/>
+              <a:buChar char="•"/>
+            </a:pPr>
+            <a:r>
+              <a:rPr lang="en-US" dirty="0"/>
+              <a:t>Who is most victimized: gender, ethnicity, age, </a:t>
+            </a:r>
+            <a:r>
+              <a:rPr lang="en-US" dirty="0" err="1"/>
+              <a:t>etc</a:t>
+            </a:r>
+            <a:r>
+              <a:rPr lang="en-US" dirty="0"/>
+              <a:t>?</a:t>
+            </a:r>
+          </a:p>
+          <a:p>
+            <a:pPr marL="742950" lvl="1" indent="-285750">
+              <a:buFont typeface="Arial" panose="020B0604020202020204" pitchFamily="34" charset="0"/>
+              <a:buChar char="•"/>
+            </a:pPr>
+            <a:r>
+              <a:rPr lang="en-US" dirty="0"/>
+              <a:t>It is hard to say. A more thorough analysis of population density would help.</a:t>
+            </a:r>
+          </a:p>
+          <a:p>
+            <a:pPr marL="285750" indent="-285750">
+              <a:buFont typeface="Arial" panose="020B0604020202020204" pitchFamily="34" charset="0"/>
+              <a:buChar char="•"/>
+            </a:pPr>
+            <a:r>
+              <a:rPr lang="en-US" dirty="0"/>
+              <a:t>What are the types of crime?</a:t>
+            </a:r>
+          </a:p>
+          <a:p>
+            <a:pPr marL="742950" lvl="1" indent="-285750">
+              <a:buFont typeface="Arial" panose="020B0604020202020204" pitchFamily="34" charset="0"/>
+              <a:buChar char="•"/>
+            </a:pPr>
+            <a:r>
+              <a:rPr lang="en-US" dirty="0"/>
+              <a:t>Simple assault is by far the most prevalent.</a:t>
+            </a:r>
+          </a:p>
+          <a:p>
+            <a:pPr marL="285750" indent="-285750">
+              <a:buFont typeface="Arial" panose="020B0604020202020204" pitchFamily="34" charset="0"/>
+              <a:buChar char="•"/>
+            </a:pPr>
+            <a:r>
+              <a:rPr lang="en-US" dirty="0"/>
+              <a:t>Does it change over time?</a:t>
+            </a:r>
+          </a:p>
+          <a:p>
+            <a:pPr marL="742950" lvl="1" indent="-285750">
+              <a:buFont typeface="Arial" panose="020B0604020202020204" pitchFamily="34" charset="0"/>
+              <a:buChar char="•"/>
+            </a:pPr>
+            <a:r>
+              <a:rPr lang="en-US" dirty="0"/>
+              <a:t>The distribution seems the same over time, but the victim rate has changed significantly.</a:t>
+            </a:r>
+          </a:p>
+          <a:p>
+            <a:pPr marL="285750" indent="-285750">
+              <a:buFont typeface="Arial" panose="020B0604020202020204" pitchFamily="34" charset="0"/>
+              <a:buChar char="•"/>
+            </a:pPr>
+            <a:r>
+              <a:rPr lang="en-US" dirty="0"/>
+              <a:t>Did the 2008/2009 recession have any impact?</a:t>
+            </a:r>
+          </a:p>
+          <a:p>
+            <a:pPr marL="742950" lvl="1" indent="-285750">
+              <a:buFont typeface="Arial" panose="020B0604020202020204" pitchFamily="34" charset="0"/>
+              <a:buChar char="•"/>
+            </a:pPr>
+            <a:r>
+              <a:rPr lang="en-US" dirty="0"/>
+              <a:t>Crime seems to have lowered during that time. More analysis there is warranted</a:t>
+            </a:r>
+          </a:p>
+          <a:p>
+            <a:pPr marL="285750" indent="-285750">
+              <a:buFont typeface="Arial" panose="020B0604020202020204" pitchFamily="34" charset="0"/>
+              <a:buChar char="•"/>
+            </a:pPr>
+            <a:r>
+              <a:rPr lang="en-US" dirty="0"/>
+              <a:t>Correlation analysis indicates a slight dependence on region and crime.</a:t>
+            </a:r>
+          </a:p>
+          <a:p>
+            <a:pPr marL="742950" lvl="1" indent="-285750">
+              <a:buFont typeface="Arial" panose="020B0604020202020204" pitchFamily="34" charset="0"/>
+              <a:buChar char="•"/>
+            </a:pPr>
+            <a:r>
+              <a:rPr lang="en-US" dirty="0"/>
+              <a:t>Stacked chart shows that the south region crime size changed the least over time. It was significantly high.</a:t>
+            </a:r>
+          </a:p>
+          <a:p>
+            <a:endParaRPr lang="en-US" dirty="0"/>
+          </a:p>
+        </p:txBody>
+      </p:sp>
+    </p:spTree>
+    <p:extLst>
+      <p:ext uri="{BB962C8B-B14F-4D97-AF65-F5344CB8AC3E}">
+        <p14:creationId xmlns:p14="http://schemas.microsoft.com/office/powerpoint/2010/main" val="1904855556"/>
+      </p:ext>
+    </p:extLst>
+  </p:cSld>
+  <p:clrMapOvr>
+    <a:masterClrMapping/>
+  </p:clrMapOvr>
+</p:sld>
+</file>
+
 <file path=ppt/slides/slide2.xml><?xml version="1.0" encoding="utf-8"?>
 <p:sld xmlns:a="http://schemas.openxmlformats.org/drawingml/2006/main" xmlns:r="http://schemas.openxmlformats.org/officeDocument/2006/relationships" xmlns:p="http://schemas.openxmlformats.org/presentationml/2006/main">
   <p:cSld>
@@ -5220,44 +5428,10 @@
       </p:grpSpPr>
       <p:sp>
         <p:nvSpPr>
-          <p:cNvPr id="2" name="Title 1">
+          <p:cNvPr id="2" name="TextBox 1">
             <a:extLst>
               <a:ext uri="{FF2B5EF4-FFF2-40B4-BE49-F238E27FC236}">
-                <a16:creationId xmlns:a16="http://schemas.microsoft.com/office/drawing/2014/main" id="{F1C30148-373A-4E73-AE12-CD8C4A127E2B}"/>
-              </a:ext>
-            </a:extLst>
-          </p:cNvPr>
-          <p:cNvSpPr>
-            <a:spLocks noGrp="1"/>
-          </p:cNvSpPr>
-          <p:nvPr>
-            <p:ph type="title"/>
-          </p:nvPr>
-        </p:nvSpPr>
-        <p:spPr>
-          <a:xfrm>
-            <a:off x="1130270" y="953324"/>
-            <a:ext cx="9603275" cy="610433"/>
-          </a:xfrm>
-        </p:spPr>
-        <p:txBody>
-          <a:bodyPr/>
-          <a:lstStyle/>
-          <a:p>
-            <a:pPr algn="ctr"/>
-            <a:r>
-              <a:rPr lang="en-US" dirty="0"/>
-              <a:t>Summary:</a:t>
-            </a:r>
-          </a:p>
-        </p:txBody>
-      </p:sp>
-      <p:sp>
-        <p:nvSpPr>
-          <p:cNvPr id="4" name="TextBox 3">
-            <a:extLst>
-              <a:ext uri="{FF2B5EF4-FFF2-40B4-BE49-F238E27FC236}">
-                <a16:creationId xmlns:a16="http://schemas.microsoft.com/office/drawing/2014/main" id="{BB054297-E15A-4972-BBF9-8703418C9E84}"/>
+                <a16:creationId xmlns:a16="http://schemas.microsoft.com/office/drawing/2014/main" id="{822E8D34-285E-42CB-9C7B-E0ED606D580F}"/>
               </a:ext>
             </a:extLst>
           </p:cNvPr>
@@ -5266,8 +5440,8 @@
         </p:nvSpPr>
         <p:spPr>
           <a:xfrm>
-            <a:off x="1130270" y="1683026"/>
-            <a:ext cx="9603275" cy="3970318"/>
+            <a:off x="3783436" y="151000"/>
+            <a:ext cx="4240634" cy="430887"/>
           </a:xfrm>
           <a:prstGeom prst="rect">
             <a:avLst/>
@@ -5280,122 +5454,284 @@
           </a:bodyPr>
           <a:lstStyle/>
           <a:p>
-            <a:pPr marL="285750" indent="-285750">
-              <a:buFont typeface="Arial" panose="020B0604020202020204" pitchFamily="34" charset="0"/>
-              <a:buChar char="•"/>
-            </a:pPr>
-            <a:r>
-              <a:rPr lang="en-US" dirty="0"/>
-              <a:t>Who is most victimized: gender, ethnicity, age, </a:t>
-            </a:r>
-            <a:r>
-              <a:rPr lang="en-US" dirty="0" err="1"/>
-              <a:t>etc</a:t>
-            </a:r>
-            <a:r>
-              <a:rPr lang="en-US" dirty="0"/>
-              <a:t>?</a:t>
-            </a:r>
-          </a:p>
-          <a:p>
-            <a:pPr marL="742950" lvl="1" indent="-285750">
-              <a:buFont typeface="Arial" panose="020B0604020202020204" pitchFamily="34" charset="0"/>
-              <a:buChar char="•"/>
-            </a:pPr>
-            <a:r>
-              <a:rPr lang="en-US" dirty="0"/>
-              <a:t>It is hard to say. A more thorough analysis of population density would help.</a:t>
-            </a:r>
-          </a:p>
-          <a:p>
-            <a:pPr marL="285750" indent="-285750">
-              <a:buFont typeface="Arial" panose="020B0604020202020204" pitchFamily="34" charset="0"/>
-              <a:buChar char="•"/>
-            </a:pPr>
-            <a:r>
-              <a:rPr lang="en-US" dirty="0"/>
-              <a:t>What are the types of crime?</a:t>
-            </a:r>
-          </a:p>
-          <a:p>
-            <a:pPr marL="742950" lvl="1" indent="-285750">
-              <a:buFont typeface="Arial" panose="020B0604020202020204" pitchFamily="34" charset="0"/>
-              <a:buChar char="•"/>
-            </a:pPr>
-            <a:r>
-              <a:rPr lang="en-US" dirty="0"/>
-              <a:t>Simple assault is by far the most prevalent.</a:t>
-            </a:r>
-          </a:p>
-          <a:p>
-            <a:pPr marL="285750" indent="-285750">
-              <a:buFont typeface="Arial" panose="020B0604020202020204" pitchFamily="34" charset="0"/>
-              <a:buChar char="•"/>
-            </a:pPr>
-            <a:r>
-              <a:rPr lang="en-US" dirty="0"/>
-              <a:t>Does it change over time?</a:t>
-            </a:r>
-          </a:p>
-          <a:p>
-            <a:pPr marL="742950" lvl="1" indent="-285750">
-              <a:buFont typeface="Arial" panose="020B0604020202020204" pitchFamily="34" charset="0"/>
-              <a:buChar char="•"/>
-            </a:pPr>
-            <a:r>
-              <a:rPr lang="en-US" dirty="0"/>
-              <a:t>The distribution seems the same over time, but the victim rate has changed significantly.</a:t>
-            </a:r>
-          </a:p>
-          <a:p>
-            <a:pPr marL="285750" indent="-285750">
-              <a:buFont typeface="Arial" panose="020B0604020202020204" pitchFamily="34" charset="0"/>
-              <a:buChar char="•"/>
-            </a:pPr>
-            <a:r>
-              <a:rPr lang="en-US" dirty="0"/>
-              <a:t>Did the 2008/2009 recession have any impact?</a:t>
-            </a:r>
-          </a:p>
-          <a:p>
-            <a:pPr marL="742950" lvl="1" indent="-285750">
-              <a:buFont typeface="Arial" panose="020B0604020202020204" pitchFamily="34" charset="0"/>
-              <a:buChar char="•"/>
-            </a:pPr>
-            <a:r>
-              <a:rPr lang="en-US" dirty="0"/>
-              <a:t>Crime seems to have lowered during that time. More analysis there is warranted</a:t>
-            </a:r>
-          </a:p>
-          <a:p>
-            <a:pPr marL="285750" indent="-285750">
-              <a:buFont typeface="Arial" panose="020B0604020202020204" pitchFamily="34" charset="0"/>
-              <a:buChar char="•"/>
-            </a:pPr>
-            <a:r>
-              <a:rPr lang="en-US" dirty="0"/>
-              <a:t>Correlation analysis indicates a slight dependence on region and crime.</a:t>
-            </a:r>
-          </a:p>
-          <a:p>
-            <a:pPr marL="742950" lvl="1" indent="-285750">
-              <a:buFont typeface="Arial" panose="020B0604020202020204" pitchFamily="34" charset="0"/>
-              <a:buChar char="•"/>
-            </a:pPr>
-            <a:r>
-              <a:rPr lang="en-US" dirty="0"/>
-              <a:t>Stacked chart shows that the south region crime size changed the least over time. It was significantly high.</a:t>
-            </a:r>
-          </a:p>
-          <a:p>
-            <a:endParaRPr lang="en-US" dirty="0"/>
+            <a:pPr algn="ctr"/>
+            <a:r>
+              <a:rPr lang="en-US" sz="2200">
+                <a:latin typeface="+mj-lt"/>
+              </a:rPr>
+              <a:t>Some Demographics Data</a:t>
+            </a:r>
+            <a:endParaRPr lang="en-US" sz="2200" dirty="0">
+              <a:latin typeface="+mj-lt"/>
+            </a:endParaRPr>
+          </a:p>
+        </p:txBody>
+      </p:sp>
+      <p:pic>
+        <p:nvPicPr>
+          <p:cNvPr id="18" name="Picture 17" descr="A picture containing screenshot&#10;&#10;Description automatically generated">
+            <a:extLst>
+              <a:ext uri="{FF2B5EF4-FFF2-40B4-BE49-F238E27FC236}">
+                <a16:creationId xmlns:a16="http://schemas.microsoft.com/office/drawing/2014/main" id="{6D7B6D84-AEC8-4F9A-8198-F89448C71752}"/>
+              </a:ext>
+            </a:extLst>
+          </p:cNvPr>
+          <p:cNvPicPr>
+            <a:picLocks noChangeAspect="1"/>
+          </p:cNvPicPr>
+          <p:nvPr/>
+        </p:nvPicPr>
+        <p:blipFill>
+          <a:blip r:embed="rId2">
+            <a:extLst>
+              <a:ext uri="{28A0092B-C50C-407E-A947-70E740481C1C}">
+                <a14:useLocalDpi xmlns:a14="http://schemas.microsoft.com/office/drawing/2010/main" val="0"/>
+              </a:ext>
+            </a:extLst>
+          </a:blip>
+          <a:stretch>
+            <a:fillRect/>
+          </a:stretch>
+        </p:blipFill>
+        <p:spPr>
+          <a:xfrm>
+            <a:off x="1" y="581888"/>
+            <a:ext cx="6285422" cy="5028338"/>
+          </a:xfrm>
+          <a:prstGeom prst="rect">
+            <a:avLst/>
+          </a:prstGeom>
+        </p:spPr>
+      </p:pic>
+      <p:pic>
+        <p:nvPicPr>
+          <p:cNvPr id="20" name="Picture 19">
+            <a:extLst>
+              <a:ext uri="{FF2B5EF4-FFF2-40B4-BE49-F238E27FC236}">
+                <a16:creationId xmlns:a16="http://schemas.microsoft.com/office/drawing/2014/main" id="{47E78711-F6EE-47DA-9113-93D135387350}"/>
+              </a:ext>
+            </a:extLst>
+          </p:cNvPr>
+          <p:cNvPicPr>
+            <a:picLocks noChangeAspect="1"/>
+          </p:cNvPicPr>
+          <p:nvPr/>
+        </p:nvPicPr>
+        <p:blipFill>
+          <a:blip r:embed="rId3">
+            <a:extLst>
+              <a:ext uri="{28A0092B-C50C-407E-A947-70E740481C1C}">
+                <a14:useLocalDpi xmlns:a14="http://schemas.microsoft.com/office/drawing/2010/main" val="0"/>
+              </a:ext>
+            </a:extLst>
+          </a:blip>
+          <a:stretch>
+            <a:fillRect/>
+          </a:stretch>
+        </p:blipFill>
+        <p:spPr>
+          <a:xfrm>
+            <a:off x="5906576" y="581887"/>
+            <a:ext cx="6285424" cy="5028339"/>
+          </a:xfrm>
+          <a:prstGeom prst="rect">
+            <a:avLst/>
+          </a:prstGeom>
+        </p:spPr>
+      </p:pic>
+      <p:sp>
+        <p:nvSpPr>
+          <p:cNvPr id="21" name="TextBox 20">
+            <a:extLst>
+              <a:ext uri="{FF2B5EF4-FFF2-40B4-BE49-F238E27FC236}">
+                <a16:creationId xmlns:a16="http://schemas.microsoft.com/office/drawing/2014/main" id="{29D2C920-A941-4033-8D1F-840143EFB192}"/>
+              </a:ext>
+            </a:extLst>
+          </p:cNvPr>
+          <p:cNvSpPr txBox="1"/>
+          <p:nvPr/>
+        </p:nvSpPr>
+        <p:spPr>
+          <a:xfrm>
+            <a:off x="0" y="6134432"/>
+            <a:ext cx="5906576" cy="615553"/>
+          </a:xfrm>
+          <a:prstGeom prst="rect">
+            <a:avLst/>
+          </a:prstGeom>
+          <a:noFill/>
+        </p:spPr>
+        <p:txBody>
+          <a:bodyPr wrap="square" rtlCol="0">
+            <a:spAutoFit/>
+          </a:bodyPr>
+          <a:lstStyle/>
+          <a:p>
+            <a:r>
+              <a:rPr lang="en-US" sz="1700" dirty="0">
+                <a:solidFill>
+                  <a:schemeClr val="bg1">
+                    <a:lumMod val="95000"/>
+                  </a:schemeClr>
+                </a:solidFill>
+              </a:rPr>
+              <a:t>While most crimes increase or decrease with wealth shallowly, simple assault see a much sharper increase. </a:t>
+            </a:r>
+          </a:p>
+        </p:txBody>
+      </p:sp>
+      <p:sp>
+        <p:nvSpPr>
+          <p:cNvPr id="23" name="TextBox 22">
+            <a:extLst>
+              <a:ext uri="{FF2B5EF4-FFF2-40B4-BE49-F238E27FC236}">
+                <a16:creationId xmlns:a16="http://schemas.microsoft.com/office/drawing/2014/main" id="{2BBD23FF-E77F-478C-805F-8C011F9BA5DE}"/>
+              </a:ext>
+            </a:extLst>
+          </p:cNvPr>
+          <p:cNvSpPr txBox="1"/>
+          <p:nvPr/>
+        </p:nvSpPr>
+        <p:spPr>
+          <a:xfrm>
+            <a:off x="6096000" y="6134432"/>
+            <a:ext cx="6095999" cy="584775"/>
+          </a:xfrm>
+          <a:prstGeom prst="rect">
+            <a:avLst/>
+          </a:prstGeom>
+          <a:noFill/>
+        </p:spPr>
+        <p:txBody>
+          <a:bodyPr wrap="square" rtlCol="0">
+            <a:spAutoFit/>
+          </a:bodyPr>
+          <a:lstStyle/>
+          <a:p>
+            <a:r>
+              <a:rPr lang="en-US" sz="1600" dirty="0">
+                <a:solidFill>
+                  <a:schemeClr val="bg1">
+                    <a:lumMod val="95000"/>
+                  </a:schemeClr>
+                </a:solidFill>
+              </a:rPr>
+              <a:t>A shift from crimes by acquaintance being more common at young ages to crimes by strangers at older ages</a:t>
+            </a:r>
           </a:p>
         </p:txBody>
       </p:sp>
     </p:spTree>
     <p:extLst>
       <p:ext uri="{BB962C8B-B14F-4D97-AF65-F5344CB8AC3E}">
-        <p14:creationId xmlns:p14="http://schemas.microsoft.com/office/powerpoint/2010/main" val="1904855556"/>
+        <p14:creationId xmlns:p14="http://schemas.microsoft.com/office/powerpoint/2010/main" val="194954725"/>
+      </p:ext>
+    </p:extLst>
+  </p:cSld>
+  <p:clrMapOvr>
+    <a:masterClrMapping/>
+  </p:clrMapOvr>
+</p:sld>
+</file>
+
+<file path=ppt/slides/slide9.xml><?xml version="1.0" encoding="utf-8"?>
+<p:sld xmlns:a="http://schemas.openxmlformats.org/drawingml/2006/main" xmlns:r="http://schemas.openxmlformats.org/officeDocument/2006/relationships" xmlns:p="http://schemas.openxmlformats.org/presentationml/2006/main">
+  <p:cSld>
+    <p:spTree>
+      <p:nvGrpSpPr>
+        <p:cNvPr id="1" name=""/>
+        <p:cNvGrpSpPr/>
+        <p:nvPr/>
+      </p:nvGrpSpPr>
+      <p:grpSpPr>
+        <a:xfrm>
+          <a:off x="0" y="0"/>
+          <a:ext cx="0" cy="0"/>
+          <a:chOff x="0" y="0"/>
+          <a:chExt cx="0" cy="0"/>
+        </a:xfrm>
+      </p:grpSpPr>
+      <p:sp>
+        <p:nvSpPr>
+          <p:cNvPr id="8" name="TextBox 7">
+            <a:extLst>
+              <a:ext uri="{FF2B5EF4-FFF2-40B4-BE49-F238E27FC236}">
+                <a16:creationId xmlns:a16="http://schemas.microsoft.com/office/drawing/2014/main" id="{7385FF05-517A-403A-B8FB-46805295FB14}"/>
+              </a:ext>
+            </a:extLst>
+          </p:cNvPr>
+          <p:cNvSpPr txBox="1"/>
+          <p:nvPr/>
+        </p:nvSpPr>
+        <p:spPr>
+          <a:xfrm>
+            <a:off x="3562349" y="161925"/>
+            <a:ext cx="5067300" cy="400110"/>
+          </a:xfrm>
+          <a:prstGeom prst="rect">
+            <a:avLst/>
+          </a:prstGeom>
+          <a:noFill/>
+        </p:spPr>
+        <p:txBody>
+          <a:bodyPr wrap="square" rtlCol="0">
+            <a:spAutoFit/>
+          </a:bodyPr>
+          <a:lstStyle/>
+          <a:p>
+            <a:pPr algn="ctr"/>
+            <a:r>
+              <a:rPr lang="en-US" sz="2000">
+                <a:latin typeface="+mj-lt"/>
+              </a:rPr>
+              <a:t>Demographics continued</a:t>
+            </a:r>
+            <a:endParaRPr lang="en-US" sz="2000" dirty="0">
+              <a:latin typeface="+mj-lt"/>
+            </a:endParaRPr>
+          </a:p>
+        </p:txBody>
+      </p:sp>
+      <p:pic>
+        <p:nvPicPr>
+          <p:cNvPr id="10" name="Picture 9" descr="A picture containing implement, pencil&#10;&#10;Description automatically generated">
+            <a:extLst>
+              <a:ext uri="{FF2B5EF4-FFF2-40B4-BE49-F238E27FC236}">
+                <a16:creationId xmlns:a16="http://schemas.microsoft.com/office/drawing/2014/main" id="{3CAA8348-3CCE-416F-BB6E-68B0D37F9681}"/>
+              </a:ext>
+            </a:extLst>
+          </p:cNvPr>
+          <p:cNvPicPr>
+            <a:picLocks noChangeAspect="1"/>
+          </p:cNvPicPr>
+          <p:nvPr/>
+        </p:nvPicPr>
+        <p:blipFill>
+          <a:blip r:embed="rId2">
+            <a:extLst>
+              <a:ext uri="{28A0092B-C50C-407E-A947-70E740481C1C}">
+                <a14:useLocalDpi xmlns:a14="http://schemas.microsoft.com/office/drawing/2010/main" val="0"/>
+              </a:ext>
+            </a:extLst>
+          </a:blip>
+          <a:stretch>
+            <a:fillRect/>
+          </a:stretch>
+        </p:blipFill>
+        <p:spPr>
+          <a:xfrm>
+            <a:off x="327422" y="562035"/>
+            <a:ext cx="11537156" cy="6153150"/>
+          </a:xfrm>
+          <a:prstGeom prst="rect">
+            <a:avLst/>
+          </a:prstGeom>
+        </p:spPr>
+      </p:pic>
+    </p:spTree>
+    <p:extLst>
+      <p:ext uri="{BB962C8B-B14F-4D97-AF65-F5344CB8AC3E}">
+        <p14:creationId xmlns:p14="http://schemas.microsoft.com/office/powerpoint/2010/main" val="4065764120"/>
       </p:ext>
     </p:extLst>
   </p:cSld>

</xml_diff>